<commit_message>
update x of group shape
</commit_message>
<xml_diff>
--- a/ShapeCrawler.Tests/Resource/autoshape/autoshape-case015.pptx
+++ b/ShapeCrawler.Tests/Resource/autoshape/autoshape-case015.pptx
@@ -238,7 +238,7 @@
           <a:p>
             <a:fld id="{17B0E2F1-F5EC-4708-BB7A-260D58CE6E09}" type="datetimeFigureOut">
               <a:rPr lang="en-US" smtClean="0"/>
-              <a:t>11/25/2022</a:t>
+              <a:t>11/26/2022</a:t>
             </a:fld>
             <a:endParaRPr lang="en-US"/>
           </a:p>
@@ -415,7 +415,7 @@
           <a:p>
             <a:fld id="{BB8E4D5A-60A2-498F-B618-80D01F3D83C0}" type="datetimeFigureOut">
               <a:rPr lang="en-US" smtClean="0"/>
-              <a:t>11/25/2022</a:t>
+              <a:t>11/26/2022</a:t>
             </a:fld>
             <a:endParaRPr lang="en-US"/>
           </a:p>
@@ -1141,6 +1141,97 @@
           <a:chExt cx="0" cy="0"/>
         </a:xfrm>
       </p:grpSpPr>
+      <p:grpSp>
+        <p:nvGrpSpPr>
+          <p:cNvPr id="5" name="Group 1">
+            <a:extLst>
+              <a:ext uri="{FF2B5EF4-FFF2-40B4-BE49-F238E27FC236}">
+                <a16:creationId xmlns:a16="http://schemas.microsoft.com/office/drawing/2014/main" id="{BA1CB375-9000-D98F-7ACE-9DD4F1BEEB4F}"/>
+              </a:ext>
+            </a:extLst>
+          </p:cNvPr>
+          <p:cNvGrpSpPr/>
+          <p:nvPr/>
+        </p:nvGrpSpPr>
+        <p:grpSpPr>
+          <a:xfrm>
+            <a:off x="655551" y="2080940"/>
+            <a:ext cx="1261950" cy="941654"/>
+            <a:chOff x="1848534" y="2203770"/>
+            <a:chExt cx="1261950" cy="941654"/>
+          </a:xfrm>
+        </p:grpSpPr>
+        <p:sp>
+          <p:nvSpPr>
+            <p:cNvPr id="4" name="TextBox 2">
+              <a:extLst>
+                <a:ext uri="{FF2B5EF4-FFF2-40B4-BE49-F238E27FC236}">
+                  <a16:creationId xmlns:a16="http://schemas.microsoft.com/office/drawing/2014/main" id="{9A7E722D-9EE9-E3A8-E957-379B0F93D0E7}"/>
+                </a:ext>
+              </a:extLst>
+            </p:cNvPr>
+            <p:cNvSpPr txBox="1"/>
+            <p:nvPr/>
+          </p:nvSpPr>
+          <p:spPr>
+            <a:xfrm>
+              <a:off x="1848534" y="2776092"/>
+              <a:ext cx="1261949" cy="369332"/>
+            </a:xfrm>
+            <a:prstGeom prst="rect">
+              <a:avLst/>
+            </a:prstGeom>
+            <a:noFill/>
+          </p:spPr>
+          <p:txBody>
+            <a:bodyPr wrap="none" rtlCol="0">
+              <a:spAutoFit/>
+            </a:bodyPr>
+            <a:lstStyle/>
+            <a:p>
+              <a:r>
+                <a:rPr lang="en-US" dirty="0"/>
+                <a:t>Text Box 2</a:t>
+              </a:r>
+            </a:p>
+          </p:txBody>
+        </p:sp>
+        <p:sp>
+          <p:nvSpPr>
+            <p:cNvPr id="3" name="TextBox 1">
+              <a:extLst>
+                <a:ext uri="{FF2B5EF4-FFF2-40B4-BE49-F238E27FC236}">
+                  <a16:creationId xmlns:a16="http://schemas.microsoft.com/office/drawing/2014/main" id="{72AF4AD1-CEA0-3060-7492-8236C27212F7}"/>
+                </a:ext>
+              </a:extLst>
+            </p:cNvPr>
+            <p:cNvSpPr txBox="1"/>
+            <p:nvPr/>
+          </p:nvSpPr>
+          <p:spPr>
+            <a:xfrm>
+              <a:off x="1848535" y="2203770"/>
+              <a:ext cx="1261949" cy="369332"/>
+            </a:xfrm>
+            <a:prstGeom prst="rect">
+              <a:avLst/>
+            </a:prstGeom>
+            <a:noFill/>
+          </p:spPr>
+          <p:txBody>
+            <a:bodyPr wrap="none" rtlCol="0">
+              <a:spAutoFit/>
+            </a:bodyPr>
+            <a:lstStyle/>
+            <a:p>
+              <a:r>
+                <a:rPr lang="en-US" dirty="0"/>
+                <a:t>Text Box 1</a:t>
+              </a:r>
+            </a:p>
+          </p:txBody>
+        </p:sp>
+      </p:grpSp>
       <p:sp>
         <p:nvSpPr>
           <p:cNvPr id="2" name="Title 1">

</xml_diff>

<commit_message>
parse points of spacing
</commit_message>
<xml_diff>
--- a/ShapeCrawler.Tests/Resource/autoshape/autoshape-case015.pptx
+++ b/ShapeCrawler.Tests/Resource/autoshape/autoshape-case015.pptx
@@ -1143,6 +1143,50 @@
       </p:grpSpPr>
       <p:sp>
         <p:nvSpPr>
+          <p:cNvPr id="9" name="TextBox 6">
+            <a:extLst>
+              <a:ext uri="{FF2B5EF4-FFF2-40B4-BE49-F238E27FC236}">
+                <a16:creationId xmlns:a16="http://schemas.microsoft.com/office/drawing/2014/main" id="{78107B2A-065B-A154-3330-6DCE302F194A}"/>
+              </a:ext>
+            </a:extLst>
+          </p:cNvPr>
+          <p:cNvSpPr txBox="1"/>
+          <p:nvPr/>
+        </p:nvSpPr>
+        <p:spPr>
+          <a:xfrm>
+            <a:off x="5999593" y="2080940"/>
+            <a:ext cx="1197828" cy="356508"/>
+          </a:xfrm>
+          <a:prstGeom prst="rect">
+            <a:avLst/>
+          </a:prstGeom>
+          <a:noFill/>
+        </p:spPr>
+        <p:txBody>
+          <a:bodyPr wrap="none" rtlCol="0">
+            <a:spAutoFit/>
+          </a:bodyPr>
+          <a:lstStyle/>
+          <a:p>
+            <a:pPr>
+              <a:lnSpc>
+                <a:spcPts val="2160"/>
+              </a:lnSpc>
+            </a:pPr>
+            <a:r>
+              <a:rPr lang="en-US" dirty="0" err="1"/>
+              <a:t>TextBox</a:t>
+            </a:r>
+            <a:r>
+              <a:rPr lang="en-US" dirty="0"/>
+              <a:t> 6</a:t>
+            </a:r>
+          </a:p>
+        </p:txBody>
+      </p:sp>
+      <p:sp>
+        <p:nvSpPr>
           <p:cNvPr id="8" name="TextBox 5">
             <a:extLst>
               <a:ext uri="{FF2B5EF4-FFF2-40B4-BE49-F238E27FC236}">
@@ -1218,7 +1262,7 @@
         <p:spPr>
           <a:xfrm>
             <a:off x="2557670" y="2653262"/>
-            <a:ext cx="1197828" cy="369332"/>
+            <a:ext cx="1197828" cy="456535"/>
           </a:xfrm>
           <a:prstGeom prst="rect">
             <a:avLst/>
@@ -1231,6 +1275,11 @@
           </a:bodyPr>
           <a:lstStyle/>
           <a:p>
+            <a:pPr>
+              <a:lnSpc>
+                <a:spcPct val="150000"/>
+              </a:lnSpc>
+            </a:pPr>
             <a:r>
               <a:rPr lang="en-US" dirty="0" err="1"/>
               <a:t>TextBox</a:t>
@@ -1257,7 +1306,7 @@
         <p:spPr>
           <a:xfrm>
             <a:off x="2557670" y="2080940"/>
-            <a:ext cx="1197828" cy="369332"/>
+            <a:ext cx="1197828" cy="560410"/>
           </a:xfrm>
           <a:prstGeom prst="rect">
             <a:avLst/>
@@ -1270,6 +1319,11 @@
           </a:bodyPr>
           <a:lstStyle/>
           <a:p>
+            <a:pPr>
+              <a:lnSpc>
+                <a:spcPct val="200000"/>
+              </a:lnSpc>
+            </a:pPr>
             <a:r>
               <a:rPr lang="en-US" dirty="0" err="1">
                 <a:highlight>

</xml_diff>

<commit_message>
rename Name on LatinName
</commit_message>
<xml_diff>
--- a/ShapeCrawler.Tests/Resource/autoshape/autoshape-case015.pptx
+++ b/ShapeCrawler.Tests/Resource/autoshape/autoshape-case015.pptx
@@ -238,7 +238,7 @@
           <a:p>
             <a:fld id="{17B0E2F1-F5EC-4708-BB7A-260D58CE6E09}" type="datetimeFigureOut">
               <a:rPr lang="en-US" smtClean="0"/>
-              <a:t>12/14/2022</a:t>
+              <a:t>12/27/2022</a:t>
             </a:fld>
             <a:endParaRPr lang="en-US"/>
           </a:p>
@@ -316,7 +316,7 @@
           <a:p>
             <a:fld id="{E2C904F2-C399-483C-B5AE-095EAEF586A9}" type="slidenum">
               <a:rPr lang="en-US" smtClean="0"/>
-              <a:t>‹#›</a:t>
+              <a:t>‹Nr.›</a:t>
             </a:fld>
             <a:endParaRPr lang="en-US"/>
           </a:p>
@@ -415,7 +415,7 @@
           <a:p>
             <a:fld id="{BB8E4D5A-60A2-498F-B618-80D01F3D83C0}" type="datetimeFigureOut">
               <a:rPr lang="en-US" smtClean="0"/>
-              <a:t>12/14/2022</a:t>
+              <a:t>12/27/2022</a:t>
             </a:fld>
             <a:endParaRPr lang="en-US"/>
           </a:p>
@@ -573,7 +573,7 @@
           <a:p>
             <a:fld id="{EA09883E-9D2F-4C3E-B0F9-57FF16872F1D}" type="slidenum">
               <a:rPr lang="en-US" smtClean="0"/>
-              <a:t>‹#›</a:t>
+              <a:t>‹Nr.›</a:t>
             </a:fld>
             <a:endParaRPr lang="en-US"/>
           </a:p>
@@ -1141,6 +1141,58 @@
           <a:chExt cx="0" cy="0"/>
         </a:xfrm>
       </p:grpSpPr>
+      <p:sp>
+        <p:nvSpPr>
+          <p:cNvPr id="11" name="TextBox 7">
+            <a:extLst>
+              <a:ext uri="{FF2B5EF4-FFF2-40B4-BE49-F238E27FC236}">
+                <a16:creationId xmlns:a16="http://schemas.microsoft.com/office/drawing/2014/main" id="{B127AFA8-511A-4987-A37B-9452AD454908}"/>
+              </a:ext>
+            </a:extLst>
+          </p:cNvPr>
+          <p:cNvSpPr txBox="1"/>
+          <p:nvPr/>
+        </p:nvSpPr>
+        <p:spPr>
+          <a:xfrm>
+            <a:off x="5999593" y="2667576"/>
+            <a:ext cx="646331" cy="348365"/>
+          </a:xfrm>
+          <a:prstGeom prst="rect">
+            <a:avLst/>
+          </a:prstGeom>
+          <a:noFill/>
+          <a:ln w="3175">
+            <a:solidFill>
+              <a:schemeClr val="tx1"/>
+            </a:solidFill>
+          </a:ln>
+        </p:spPr>
+        <p:txBody>
+          <a:bodyPr wrap="none" rtlCol="0">
+            <a:spAutoFit/>
+          </a:bodyPr>
+          <a:lstStyle/>
+          <a:p>
+            <a:pPr>
+              <a:lnSpc>
+                <a:spcPts val="2160"/>
+              </a:lnSpc>
+            </a:pPr>
+            <a:r>
+              <a:rPr lang="zh-CN" altLang="en-US" dirty="0">
+                <a:latin typeface="Showcard Gothic" panose="04020904020102020604" pitchFamily="82" charset="0"/>
+                <a:ea typeface="SimSun" panose="02010600030101010101" pitchFamily="2" charset="-122"/>
+              </a:rPr>
+              <a:t>世界</a:t>
+            </a:r>
+            <a:endParaRPr lang="en-US" dirty="0">
+              <a:latin typeface="Showcard Gothic" panose="04020904020102020604" pitchFamily="82" charset="0"/>
+              <a:ea typeface="SimSun" panose="02010600030101010101" pitchFamily="2" charset="-122"/>
+            </a:endParaRPr>
+          </a:p>
+        </p:txBody>
+      </p:sp>
       <p:sp>
         <p:nvSpPr>
           <p:cNvPr id="9" name="TextBox 6">

</xml_diff>

<commit_message>
sets East Asian font
</commit_message>
<xml_diff>
--- a/ShapeCrawler.Tests/Resource/autoshape/autoshape-case015.pptx
+++ b/ShapeCrawler.Tests/Resource/autoshape/autoshape-case015.pptx
@@ -238,7 +238,7 @@
           <a:p>
             <a:fld id="{17B0E2F1-F5EC-4708-BB7A-260D58CE6E09}" type="datetimeFigureOut">
               <a:rPr lang="en-US" smtClean="0"/>
-              <a:t>12/27/2022</a:t>
+              <a:t>1/1/2023</a:t>
             </a:fld>
             <a:endParaRPr lang="en-US"/>
           </a:p>
@@ -415,7 +415,7 @@
           <a:p>
             <a:fld id="{BB8E4D5A-60A2-498F-B618-80D01F3D83C0}" type="datetimeFigureOut">
               <a:rPr lang="en-US" smtClean="0"/>
-              <a:t>12/27/2022</a:t>
+              <a:t>1/1/2023</a:t>
             </a:fld>
             <a:endParaRPr lang="en-US"/>
           </a:p>
@@ -796,7 +796,7 @@
   <p:clrMapOvr>
     <a:masterClrMapping/>
   </p:clrMapOvr>
-  <p:extLst>
+  <p:extLst mod="1">
     <p:ext uri="{DCECCB84-F9BA-43D5-87BE-67443E8EF086}">
       <p15:sldGuideLst xmlns:p15="http://schemas.microsoft.com/office/powerpoint/2012/main"/>
     </p:ext>
@@ -1116,7 +1116,7 @@
       </a:lvl9pPr>
     </p:otherStyle>
   </p:txStyles>
-  <p:extLst>
+  <p:extLst mod="1">
     <p:ext uri="{27BBF7A9-308A-43DC-89C8-2F10F3537804}">
       <p15:sldGuideLst xmlns:p15="http://schemas.microsoft.com/office/powerpoint/2012/main"/>
     </p:ext>
@@ -1584,10 +1584,10 @@
         <a:srgbClr val="800080"/>
       </a:folHlink>
     </a:clrScheme>
-    <a:fontScheme name="Custom 4">
+    <a:fontScheme name="Benutzerdefiniert 1">
       <a:majorFont>
         <a:latin typeface="Arial"/>
-        <a:ea typeface=""/>
+        <a:ea typeface="SimSun"/>
         <a:cs typeface=""/>
       </a:majorFont>
       <a:minorFont>

</xml_diff>